<commit_message>
Modified image of iPOP2014 slide.
</commit_message>
<xml_diff>
--- a/presentation/iPOP2014.pptx
+++ b/presentation/iPOP2014.pptx
@@ -217,7 +217,7 @@
             <a:fld id="{5B4FE32D-F27D-4BB6-B878-E85FE4E88E67}" type="datetimeFigureOut">
               <a:rPr kumimoji="1" lang="ja-JP" altLang="en-US" smtClean="0"/>
               <a:pPr/>
-              <a:t>2014/06/16</a:t>
+              <a:t>2014/07/10</a:t>
             </a:fld>
             <a:endParaRPr kumimoji="1" lang="ja-JP" altLang="en-US"/>
           </a:p>
@@ -383,7 +383,7 @@
           <a:p>
             <a:fld id="{C7D0960E-904C-470D-B842-78C8DDAAF9C9}" type="datetimeFigureOut">
               <a:rPr kumimoji="1" lang="ja-JP" altLang="en-US" smtClean="0"/>
-              <a:t>2014/06/16</a:t>
+              <a:t>2014/07/10</a:t>
             </a:fld>
             <a:endParaRPr kumimoji="1" lang="ja-JP" altLang="en-US"/>
           </a:p>
@@ -3277,7 +3277,7 @@
             <a:fld id="{4A1D122A-46D8-474A-82A6-D037D8656CC4}" type="datetimeFigureOut">
               <a:rPr kumimoji="1" lang="ja-JP" altLang="en-US" smtClean="0"/>
               <a:pPr/>
-              <a:t>2014/06/16</a:t>
+              <a:t>2014/07/10</a:t>
             </a:fld>
             <a:endParaRPr kumimoji="1" lang="ja-JP" altLang="en-US"/>
           </a:p>
@@ -3381,7 +3381,7 @@
             <a:fld id="{4A1D122A-46D8-474A-82A6-D037D8656CC4}" type="datetimeFigureOut">
               <a:rPr kumimoji="1" lang="ja-JP" altLang="en-US" smtClean="0"/>
               <a:pPr/>
-              <a:t>2014/06/16</a:t>
+              <a:t>2014/07/10</a:t>
             </a:fld>
             <a:endParaRPr kumimoji="1" lang="ja-JP" altLang="en-US"/>
           </a:p>
@@ -3638,7 +3638,7 @@
             <a:fld id="{4A1D122A-46D8-474A-82A6-D037D8656CC4}" type="datetimeFigureOut">
               <a:rPr lang="ja-JP" altLang="en-US" smtClean="0"/>
               <a:pPr/>
-              <a:t>2014/06/16</a:t>
+              <a:t>2014/07/10</a:t>
             </a:fld>
             <a:endParaRPr lang="ja-JP" altLang="en-US"/>
           </a:p>
@@ -4089,13 +4089,8 @@
           <a:p>
             <a:r>
               <a:rPr kumimoji="1" lang="en-US" altLang="ja-JP" dirty="0" smtClean="0"/>
-              <a:t>June </a:t>
-            </a:r>
-            <a:r>
-              <a:rPr kumimoji="1" lang="en-US" altLang="ja-JP" dirty="0" smtClean="0"/>
-              <a:t>2014</a:t>
-            </a:r>
-            <a:endParaRPr kumimoji="1" lang="en-US" altLang="ja-JP" dirty="0" smtClean="0"/>
+              <a:t>June 2014</a:t>
+            </a:r>
           </a:p>
           <a:p>
             <a:r>
@@ -12093,36 +12088,6 @@
           </p:spPr>
         </p:pic>
       </p:grpSp>
-      <p:pic>
-        <p:nvPicPr>
-          <p:cNvPr id="15" name="図 14"/>
-          <p:cNvPicPr>
-            <a:picLocks noChangeAspect="1"/>
-          </p:cNvPicPr>
-          <p:nvPr/>
-        </p:nvPicPr>
-        <p:blipFill>
-          <a:blip r:embed="rId5">
-            <a:extLst>
-              <a:ext uri="{28A0092B-C50C-407E-A947-70E740481C1C}">
-                <a14:useLocalDpi xmlns:a14="http://schemas.microsoft.com/office/drawing/2010/main" val="0"/>
-              </a:ext>
-            </a:extLst>
-          </a:blip>
-          <a:stretch>
-            <a:fillRect/>
-          </a:stretch>
-        </p:blipFill>
-        <p:spPr>
-          <a:xfrm>
-            <a:off x="5567680" y="3466311"/>
-            <a:ext cx="3241040" cy="2162381"/>
-          </a:xfrm>
-          <a:prstGeom prst="rect">
-            <a:avLst/>
-          </a:prstGeom>
-        </p:spPr>
-      </p:pic>
       <p:sp>
         <p:nvSpPr>
           <p:cNvPr id="16" name="テキスト ボックス 15"/>
@@ -12131,8 +12096,8 @@
         </p:nvSpPr>
         <p:spPr>
           <a:xfrm>
-            <a:off x="6417765" y="5721831"/>
-            <a:ext cx="1540871" cy="369332"/>
+            <a:off x="6516216" y="3356992"/>
+            <a:ext cx="1616772" cy="369332"/>
           </a:xfrm>
           <a:prstGeom prst="rect">
             <a:avLst/>
@@ -12155,7 +12120,31 @@
                 </a:solidFill>
                 <a:ea typeface="メイリオ"/>
               </a:rPr>
-              <a:t>A bird in cloud</a:t>
+              <a:t>A bird </a:t>
+            </a:r>
+            <a:r>
+              <a:rPr lang="en-US" altLang="ja-JP" smtClean="0">
+                <a:solidFill>
+                  <a:schemeClr val="tx1">
+                    <a:lumMod val="65000"/>
+                    <a:lumOff val="35000"/>
+                  </a:schemeClr>
+                </a:solidFill>
+                <a:ea typeface="メイリオ"/>
+              </a:rPr>
+              <a:t>in </a:t>
+            </a:r>
+            <a:r>
+              <a:rPr lang="en-US" altLang="ja-JP" smtClean="0">
+                <a:solidFill>
+                  <a:schemeClr val="tx1">
+                    <a:lumMod val="65000"/>
+                    <a:lumOff val="35000"/>
+                  </a:schemeClr>
+                </a:solidFill>
+                <a:ea typeface="メイリオ"/>
+              </a:rPr>
+              <a:t>cloud</a:t>
             </a:r>
             <a:endParaRPr lang="ja-JP" altLang="en-US" dirty="0">
               <a:solidFill>

</xml_diff>